<commit_message>
Good implementation by veeru and rosu
</commit_message>
<xml_diff>
--- a/Presentation/An Improved ID3 algorithm for clinical data Classification review 2.pptx
+++ b/Presentation/An Improved ID3 algorithm for clinical data Classification review 2.pptx
@@ -5,7 +5,7 @@
     <p:sldMasterId id="2147483648" r:id="rId1"/>
   </p:sldMasterIdLst>
   <p:notesMasterIdLst>
-    <p:notesMasterId r:id="rId17"/>
+    <p:notesMasterId r:id="rId21"/>
   </p:notesMasterIdLst>
   <p:sldIdLst>
     <p:sldId id="276" r:id="rId2"/>
@@ -23,6 +23,10 @@
     <p:sldId id="273" r:id="rId14"/>
     <p:sldId id="268" r:id="rId15"/>
     <p:sldId id="275" r:id="rId16"/>
+    <p:sldId id="277" r:id="rId17"/>
+    <p:sldId id="278" r:id="rId18"/>
+    <p:sldId id="279" r:id="rId19"/>
+    <p:sldId id="280" r:id="rId20"/>
   </p:sldIdLst>
   <p:sldSz cx="12192000" cy="6858000"/>
   <p:notesSz cx="6858000" cy="9144000"/>
@@ -7234,154 +7238,110 @@
           <a:lstStyle/>
           <a:p>
             <a:r>
-              <a:rPr lang="en-US" dirty="0"/>
-              <a:t>usage: main.py [-h] [-d] -a ATTRIBUTES_FILE -l TRAINING_FILE [-</a:t>
-            </a:r>
-            <a:r>
               <a:rPr lang="en-US" dirty="0" smtClean="0"/>
-              <a:t>t TESTING_FILE]</a:t>
-            </a:r>
-            <a:endParaRPr lang="en-US" dirty="0"/>
-          </a:p>
-          <a:p>
-            <a:r>
-              <a:rPr lang="en-US" dirty="0"/>
+              <a:t>usage: main.py [-h] [-d] -a ATTRIBUTES_FILE -l TRAINING_FILE [-t TESTING_FILE]</a:t>
+            </a:r>
+          </a:p>
+          <a:p>
+            <a:r>
+              <a:rPr lang="en-US" dirty="0" smtClean="0"/>
               <a:t>                   </a:t>
             </a:r>
             <a:r>
-              <a:rPr lang="en-US" dirty="0" err="1"/>
+              <a:rPr lang="en-US" dirty="0" err="1" smtClean="0"/>
               <a:t>dtree</a:t>
             </a:r>
             <a:r>
-              <a:rPr lang="en-US" dirty="0"/>
+              <a:rPr lang="en-US" dirty="0" smtClean="0"/>
               <a:t>-module classifier</a:t>
             </a:r>
           </a:p>
           <a:p>
             <a:r>
-              <a:rPr lang="en-US" dirty="0"/>
+              <a:rPr lang="en-US" dirty="0" smtClean="0"/>
               <a:t>    Train (and optionally test) a decision tree</a:t>
             </a:r>
           </a:p>
           <a:p>
             <a:r>
-              <a:rPr lang="en-US" dirty="0"/>
+              <a:rPr lang="en-US" dirty="0" smtClean="0"/>
               <a:t>    positional arguments:</a:t>
             </a:r>
           </a:p>
           <a:p>
             <a:r>
-              <a:rPr lang="en-US" dirty="0"/>
+              <a:rPr lang="en-US" dirty="0" smtClean="0"/>
               <a:t>      </a:t>
             </a:r>
             <a:r>
-              <a:rPr lang="en-US" dirty="0" err="1"/>
+              <a:rPr lang="en-US" dirty="0" err="1" smtClean="0"/>
               <a:t>dtree</a:t>
             </a:r>
             <a:r>
-              <a:rPr lang="en-US" dirty="0"/>
-              <a:t>-module     </a:t>
-            </a:r>
-            <a:r>
               <a:rPr lang="en-US" dirty="0" smtClean="0"/>
-              <a:t>Decision </a:t>
-            </a:r>
-            <a:r>
-              <a:rPr lang="en-US" dirty="0"/>
-              <a:t>tree module name</a:t>
-            </a:r>
-          </a:p>
-          <a:p>
-            <a:r>
-              <a:rPr lang="en-US" dirty="0"/>
+              <a:t>-module     Decision tree module name</a:t>
+            </a:r>
+          </a:p>
+          <a:p>
+            <a:r>
+              <a:rPr lang="en-US" dirty="0" smtClean="0"/>
               <a:t>      classifier            Name of the attribute to use for classification</a:t>
             </a:r>
           </a:p>
           <a:p>
             <a:r>
-              <a:rPr lang="en-US" dirty="0"/>
+              <a:rPr lang="en-US" dirty="0" smtClean="0"/>
               <a:t>    optional arguments:</a:t>
             </a:r>
           </a:p>
           <a:p>
             <a:r>
-              <a:rPr lang="en-US" dirty="0"/>
+              <a:rPr lang="en-US" dirty="0" smtClean="0"/>
               <a:t>      -h, --help            show this help message and exit</a:t>
             </a:r>
           </a:p>
           <a:p>
             <a:r>
-              <a:rPr lang="en-US" dirty="0"/>
-              <a:t>      -d, --debug     </a:t>
-            </a:r>
-            <a:r>
               <a:rPr lang="en-US" dirty="0" smtClean="0"/>
-              <a:t>     enables </a:t>
-            </a:r>
-            <a:r>
-              <a:rPr lang="en-US" dirty="0"/>
-              <a:t>debug</a:t>
-            </a:r>
-          </a:p>
-          <a:p>
-            <a:r>
-              <a:rPr lang="en-US" dirty="0"/>
+              <a:t>      -d, --debug          enables debug</a:t>
+            </a:r>
+          </a:p>
+          <a:p>
+            <a:r>
+              <a:rPr lang="en-US" dirty="0" smtClean="0"/>
               <a:t>      -a ATTRIBUTES_FILE, --attributes ATTRIBUTES_FILE</a:t>
             </a:r>
           </a:p>
           <a:p>
             <a:r>
-              <a:rPr lang="en-US" dirty="0"/>
-              <a:t>                            </a:t>
-            </a:r>
-            <a:r>
               <a:rPr lang="en-US" dirty="0" smtClean="0"/>
-              <a:t>     Name </a:t>
-            </a:r>
-            <a:r>
-              <a:rPr lang="en-US" dirty="0"/>
-              <a:t>of the attribute specification file</a:t>
-            </a:r>
-          </a:p>
-          <a:p>
-            <a:r>
-              <a:rPr lang="en-US" dirty="0"/>
+              <a:t>                                 Name of the attribute specification file</a:t>
+            </a:r>
+          </a:p>
+          <a:p>
+            <a:r>
+              <a:rPr lang="en-US" dirty="0" smtClean="0"/>
               <a:t>      -l TRAINING_FILE, --train TRAINING_FILE</a:t>
             </a:r>
           </a:p>
           <a:p>
             <a:r>
-              <a:rPr lang="en-US" dirty="0"/>
-              <a:t>                            </a:t>
-            </a:r>
-            <a:r>
               <a:rPr lang="en-US" dirty="0" smtClean="0"/>
-              <a:t>     Name </a:t>
-            </a:r>
-            <a:r>
-              <a:rPr lang="en-US" dirty="0"/>
-              <a:t>of the file to use for training/learning</a:t>
-            </a:r>
-          </a:p>
-          <a:p>
-            <a:r>
-              <a:rPr lang="en-US" dirty="0"/>
+              <a:t>                                 Name of the file to use for training/learning</a:t>
+            </a:r>
+          </a:p>
+          <a:p>
+            <a:r>
+              <a:rPr lang="en-US" dirty="0" smtClean="0"/>
               <a:t>      -t TESTING_FILE, --test TESTING_FILE</a:t>
             </a:r>
           </a:p>
           <a:p>
             <a:r>
-              <a:rPr lang="en-US" dirty="0"/>
-              <a:t>                            </a:t>
-            </a:r>
-            <a:r>
               <a:rPr lang="en-US" dirty="0" smtClean="0"/>
-              <a:t>      Name </a:t>
-            </a:r>
-            <a:r>
-              <a:rPr lang="en-US" dirty="0"/>
-              <a:t>of the file to use for testing </a:t>
-            </a:r>
+              <a:t>                                  Name of the file to use for testing </a:t>
+            </a:r>
+            <a:endParaRPr lang="en-US" dirty="0"/>
           </a:p>
         </p:txBody>
       </p:sp>
@@ -8068,6 +8028,291 @@
       </p:par>
     </p:tnLst>
   </p:timing>
+</p:sld>
+</file>
+
+<file path=ppt/slides/slide16.xml><?xml version="1.0" encoding="utf-8"?>
+<p:sld xmlns:a="http://schemas.openxmlformats.org/drawingml/2006/main" xmlns:r="http://schemas.openxmlformats.org/officeDocument/2006/relationships" xmlns:p="http://schemas.openxmlformats.org/presentationml/2006/main">
+  <p:cSld>
+    <p:spTree>
+      <p:nvGrpSpPr>
+        <p:cNvPr id="1" name=""/>
+        <p:cNvGrpSpPr/>
+        <p:nvPr/>
+      </p:nvGrpSpPr>
+      <p:grpSpPr>
+        <a:xfrm>
+          <a:off x="0" y="0"/>
+          <a:ext cx="0" cy="0"/>
+          <a:chOff x="0" y="0"/>
+          <a:chExt cx="0" cy="0"/>
+        </a:xfrm>
+      </p:grpSpPr>
+      <p:sp>
+        <p:nvSpPr>
+          <p:cNvPr id="2" name="Title 1"/>
+          <p:cNvSpPr>
+            <a:spLocks noGrp="1"/>
+          </p:cNvSpPr>
+          <p:nvPr>
+            <p:ph type="title"/>
+          </p:nvPr>
+        </p:nvSpPr>
+        <p:spPr/>
+        <p:txBody>
+          <a:bodyPr/>
+          <a:lstStyle/>
+          <a:p>
+            <a:r>
+              <a:rPr lang="en-US" dirty="0" smtClean="0"/>
+              <a:t>Implementation</a:t>
+            </a:r>
+            <a:endParaRPr lang="en-US" dirty="0"/>
+          </a:p>
+        </p:txBody>
+      </p:sp>
+      <p:sp>
+        <p:nvSpPr>
+          <p:cNvPr id="4" name="Date Placeholder 3"/>
+          <p:cNvSpPr>
+            <a:spLocks noGrp="1"/>
+          </p:cNvSpPr>
+          <p:nvPr>
+            <p:ph type="dt" sz="half" idx="10"/>
+          </p:nvPr>
+        </p:nvSpPr>
+        <p:spPr/>
+        <p:txBody>
+          <a:bodyPr/>
+          <a:lstStyle/>
+          <a:p>
+            <a:fld id="{B78C9E5B-9911-4E91-9769-2D25D8811588}" type="datetime1">
+              <a:rPr lang="en-US" smtClean="0"/>
+              <a:t>01-Oct-18</a:t>
+            </a:fld>
+            <a:endParaRPr lang="en-US" dirty="0"/>
+          </a:p>
+        </p:txBody>
+      </p:sp>
+      <p:sp>
+        <p:nvSpPr>
+          <p:cNvPr id="5" name="Footer Placeholder 4"/>
+          <p:cNvSpPr>
+            <a:spLocks noGrp="1"/>
+          </p:cNvSpPr>
+          <p:nvPr>
+            <p:ph type="ftr" sz="quarter" idx="11"/>
+          </p:nvPr>
+        </p:nvSpPr>
+        <p:spPr/>
+        <p:txBody>
+          <a:bodyPr/>
+          <a:lstStyle/>
+          <a:p>
+            <a:r>
+              <a:rPr lang="en-US" smtClean="0"/>
+              <a:t>N.L.Veerendra,K.Gangadhar,P.R.Surya</a:t>
+            </a:r>
+            <a:endParaRPr lang="en-US" dirty="0"/>
+          </a:p>
+        </p:txBody>
+      </p:sp>
+      <p:sp>
+        <p:nvSpPr>
+          <p:cNvPr id="6" name="Slide Number Placeholder 5"/>
+          <p:cNvSpPr>
+            <a:spLocks noGrp="1"/>
+          </p:cNvSpPr>
+          <p:nvPr>
+            <p:ph type="sldNum" sz="quarter" idx="12"/>
+          </p:nvPr>
+        </p:nvSpPr>
+        <p:spPr/>
+        <p:txBody>
+          <a:bodyPr/>
+          <a:lstStyle/>
+          <a:p>
+            <a:fld id="{D57F1E4F-1CFF-5643-939E-217C01CDF565}" type="slidenum">
+              <a:rPr lang="en-US" smtClean="0"/>
+              <a:pPr/>
+              <a:t>16</a:t>
+            </a:fld>
+            <a:endParaRPr lang="en-US" dirty="0"/>
+          </a:p>
+        </p:txBody>
+      </p:sp>
+    </p:spTree>
+    <p:extLst>
+      <p:ext uri="{BB962C8B-B14F-4D97-AF65-F5344CB8AC3E}">
+        <p14:creationId xmlns:p14="http://schemas.microsoft.com/office/powerpoint/2010/main" val="932257927"/>
+      </p:ext>
+    </p:extLst>
+  </p:cSld>
+  <p:clrMapOvr>
+    <a:masterClrMapping/>
+  </p:clrMapOvr>
+</p:sld>
+</file>
+
+<file path=ppt/slides/slide17.xml><?xml version="1.0" encoding="utf-8"?>
+<p:sld xmlns:a="http://schemas.openxmlformats.org/drawingml/2006/main" xmlns:r="http://schemas.openxmlformats.org/officeDocument/2006/relationships" xmlns:p="http://schemas.openxmlformats.org/presentationml/2006/main">
+  <p:cSld>
+    <p:spTree>
+      <p:nvGrpSpPr>
+        <p:cNvPr id="1" name=""/>
+        <p:cNvGrpSpPr/>
+        <p:nvPr/>
+      </p:nvGrpSpPr>
+      <p:grpSpPr>
+        <a:xfrm>
+          <a:off x="0" y="0"/>
+          <a:ext cx="0" cy="0"/>
+          <a:chOff x="0" y="0"/>
+          <a:chExt cx="0" cy="0"/>
+        </a:xfrm>
+      </p:grpSpPr>
+      <p:pic>
+        <p:nvPicPr>
+          <p:cNvPr id="7" name="Picture 6"/>
+          <p:cNvPicPr>
+            <a:picLocks noChangeAspect="1"/>
+          </p:cNvPicPr>
+          <p:nvPr/>
+        </p:nvPicPr>
+        <p:blipFill>
+          <a:blip r:embed="rId2"/>
+          <a:stretch>
+            <a:fillRect/>
+          </a:stretch>
+        </p:blipFill>
+        <p:spPr>
+          <a:xfrm>
+            <a:off x="0" y="0"/>
+            <a:ext cx="12192000" cy="6858000"/>
+          </a:xfrm>
+          <a:prstGeom prst="rect">
+            <a:avLst/>
+          </a:prstGeom>
+        </p:spPr>
+      </p:pic>
+    </p:spTree>
+    <p:extLst>
+      <p:ext uri="{BB962C8B-B14F-4D97-AF65-F5344CB8AC3E}">
+        <p14:creationId xmlns:p14="http://schemas.microsoft.com/office/powerpoint/2010/main" val="2818763278"/>
+      </p:ext>
+    </p:extLst>
+  </p:cSld>
+  <p:clrMapOvr>
+    <a:masterClrMapping/>
+  </p:clrMapOvr>
+</p:sld>
+</file>
+
+<file path=ppt/slides/slide18.xml><?xml version="1.0" encoding="utf-8"?>
+<p:sld xmlns:a="http://schemas.openxmlformats.org/drawingml/2006/main" xmlns:r="http://schemas.openxmlformats.org/officeDocument/2006/relationships" xmlns:p="http://schemas.openxmlformats.org/presentationml/2006/main">
+  <p:cSld>
+    <p:spTree>
+      <p:nvGrpSpPr>
+        <p:cNvPr id="1" name=""/>
+        <p:cNvGrpSpPr/>
+        <p:nvPr/>
+      </p:nvGrpSpPr>
+      <p:grpSpPr>
+        <a:xfrm>
+          <a:off x="0" y="0"/>
+          <a:ext cx="0" cy="0"/>
+          <a:chOff x="0" y="0"/>
+          <a:chExt cx="0" cy="0"/>
+        </a:xfrm>
+      </p:grpSpPr>
+      <p:pic>
+        <p:nvPicPr>
+          <p:cNvPr id="7" name="Picture 6"/>
+          <p:cNvPicPr>
+            <a:picLocks noChangeAspect="1"/>
+          </p:cNvPicPr>
+          <p:nvPr/>
+        </p:nvPicPr>
+        <p:blipFill>
+          <a:blip r:embed="rId2"/>
+          <a:stretch>
+            <a:fillRect/>
+          </a:stretch>
+        </p:blipFill>
+        <p:spPr>
+          <a:xfrm>
+            <a:off x="0" y="0"/>
+            <a:ext cx="12192000" cy="6858000"/>
+          </a:xfrm>
+          <a:prstGeom prst="rect">
+            <a:avLst/>
+          </a:prstGeom>
+        </p:spPr>
+      </p:pic>
+    </p:spTree>
+    <p:extLst>
+      <p:ext uri="{BB962C8B-B14F-4D97-AF65-F5344CB8AC3E}">
+        <p14:creationId xmlns:p14="http://schemas.microsoft.com/office/powerpoint/2010/main" val="3345956223"/>
+      </p:ext>
+    </p:extLst>
+  </p:cSld>
+  <p:clrMapOvr>
+    <a:masterClrMapping/>
+  </p:clrMapOvr>
+</p:sld>
+</file>
+
+<file path=ppt/slides/slide19.xml><?xml version="1.0" encoding="utf-8"?>
+<p:sld xmlns:a="http://schemas.openxmlformats.org/drawingml/2006/main" xmlns:r="http://schemas.openxmlformats.org/officeDocument/2006/relationships" xmlns:p="http://schemas.openxmlformats.org/presentationml/2006/main">
+  <p:cSld>
+    <p:spTree>
+      <p:nvGrpSpPr>
+        <p:cNvPr id="1" name=""/>
+        <p:cNvGrpSpPr/>
+        <p:nvPr/>
+      </p:nvGrpSpPr>
+      <p:grpSpPr>
+        <a:xfrm>
+          <a:off x="0" y="0"/>
+          <a:ext cx="0" cy="0"/>
+          <a:chOff x="0" y="0"/>
+          <a:chExt cx="0" cy="0"/>
+        </a:xfrm>
+      </p:grpSpPr>
+      <p:pic>
+        <p:nvPicPr>
+          <p:cNvPr id="8" name="Picture 7"/>
+          <p:cNvPicPr>
+            <a:picLocks noChangeAspect="1"/>
+          </p:cNvPicPr>
+          <p:nvPr/>
+        </p:nvPicPr>
+        <p:blipFill>
+          <a:blip r:embed="rId2"/>
+          <a:stretch>
+            <a:fillRect/>
+          </a:stretch>
+        </p:blipFill>
+        <p:spPr>
+          <a:xfrm>
+            <a:off x="0" y="0"/>
+            <a:ext cx="12192000" cy="6858000"/>
+          </a:xfrm>
+          <a:prstGeom prst="rect">
+            <a:avLst/>
+          </a:prstGeom>
+        </p:spPr>
+      </p:pic>
+    </p:spTree>
+    <p:extLst>
+      <p:ext uri="{BB962C8B-B14F-4D97-AF65-F5344CB8AC3E}">
+        <p14:creationId xmlns:p14="http://schemas.microsoft.com/office/powerpoint/2010/main" val="264547071"/>
+      </p:ext>
+    </p:extLst>
+  </p:cSld>
+  <p:clrMapOvr>
+    <a:masterClrMapping/>
+  </p:clrMapOvr>
 </p:sld>
 </file>
 

</xml_diff>